<commit_message>
removed ccle expr, working on data org
</commit_message>
<xml_diff>
--- a/docs/DNN_proposal_figures.pptx
+++ b/docs/DNN_proposal_figures.pptx
@@ -105,6 +105,11 @@
       </a:defRPr>
     </a:lvl9pPr>
   </p:defaultTextStyle>
+  <p:extLst>
+    <p:ext uri="{EFAFB233-063F-42B5-8137-9DF3F51BA10A}">
+      <p15:sldGuideLst xmlns:p15="http://schemas.microsoft.com/office/powerpoint/2012/main"/>
+    </p:ext>
+  </p:extLst>
 </p:presentation>
 </file>
 
@@ -255,7 +260,7 @@
           <a:p>
             <a:fld id="{FFE833FE-52F9-4C5E-990B-6B6F3E27B096}" type="datetimeFigureOut">
               <a:rPr lang="en-US" smtClean="0"/>
-              <a:t>10/5/2019</a:t>
+              <a:t>10/17/2019</a:t>
             </a:fld>
             <a:endParaRPr lang="en-US"/>
           </a:p>
@@ -453,7 +458,7 @@
           <a:p>
             <a:fld id="{FFE833FE-52F9-4C5E-990B-6B6F3E27B096}" type="datetimeFigureOut">
               <a:rPr lang="en-US" smtClean="0"/>
-              <a:t>10/5/2019</a:t>
+              <a:t>10/17/2019</a:t>
             </a:fld>
             <a:endParaRPr lang="en-US"/>
           </a:p>
@@ -661,7 +666,7 @@
           <a:p>
             <a:fld id="{FFE833FE-52F9-4C5E-990B-6B6F3E27B096}" type="datetimeFigureOut">
               <a:rPr lang="en-US" smtClean="0"/>
-              <a:t>10/5/2019</a:t>
+              <a:t>10/17/2019</a:t>
             </a:fld>
             <a:endParaRPr lang="en-US"/>
           </a:p>
@@ -859,7 +864,7 @@
           <a:p>
             <a:fld id="{FFE833FE-52F9-4C5E-990B-6B6F3E27B096}" type="datetimeFigureOut">
               <a:rPr lang="en-US" smtClean="0"/>
-              <a:t>10/5/2019</a:t>
+              <a:t>10/17/2019</a:t>
             </a:fld>
             <a:endParaRPr lang="en-US"/>
           </a:p>
@@ -1134,7 +1139,7 @@
           <a:p>
             <a:fld id="{FFE833FE-52F9-4C5E-990B-6B6F3E27B096}" type="datetimeFigureOut">
               <a:rPr lang="en-US" smtClean="0"/>
-              <a:t>10/5/2019</a:t>
+              <a:t>10/17/2019</a:t>
             </a:fld>
             <a:endParaRPr lang="en-US"/>
           </a:p>
@@ -1399,7 +1404,7 @@
           <a:p>
             <a:fld id="{FFE833FE-52F9-4C5E-990B-6B6F3E27B096}" type="datetimeFigureOut">
               <a:rPr lang="en-US" smtClean="0"/>
-              <a:t>10/5/2019</a:t>
+              <a:t>10/17/2019</a:t>
             </a:fld>
             <a:endParaRPr lang="en-US"/>
           </a:p>
@@ -1811,7 +1816,7 @@
           <a:p>
             <a:fld id="{FFE833FE-52F9-4C5E-990B-6B6F3E27B096}" type="datetimeFigureOut">
               <a:rPr lang="en-US" smtClean="0"/>
-              <a:t>10/5/2019</a:t>
+              <a:t>10/17/2019</a:t>
             </a:fld>
             <a:endParaRPr lang="en-US"/>
           </a:p>
@@ -1952,7 +1957,7 @@
           <a:p>
             <a:fld id="{FFE833FE-52F9-4C5E-990B-6B6F3E27B096}" type="datetimeFigureOut">
               <a:rPr lang="en-US" smtClean="0"/>
-              <a:t>10/5/2019</a:t>
+              <a:t>10/17/2019</a:t>
             </a:fld>
             <a:endParaRPr lang="en-US"/>
           </a:p>
@@ -2065,7 +2070,7 @@
           <a:p>
             <a:fld id="{FFE833FE-52F9-4C5E-990B-6B6F3E27B096}" type="datetimeFigureOut">
               <a:rPr lang="en-US" smtClean="0"/>
-              <a:t>10/5/2019</a:t>
+              <a:t>10/17/2019</a:t>
             </a:fld>
             <a:endParaRPr lang="en-US"/>
           </a:p>
@@ -2376,7 +2381,7 @@
           <a:p>
             <a:fld id="{FFE833FE-52F9-4C5E-990B-6B6F3E27B096}" type="datetimeFigureOut">
               <a:rPr lang="en-US" smtClean="0"/>
-              <a:t>10/5/2019</a:t>
+              <a:t>10/17/2019</a:t>
             </a:fld>
             <a:endParaRPr lang="en-US"/>
           </a:p>
@@ -2664,7 +2669,7 @@
           <a:p>
             <a:fld id="{FFE833FE-52F9-4C5E-990B-6B6F3E27B096}" type="datetimeFigureOut">
               <a:rPr lang="en-US" smtClean="0"/>
-              <a:t>10/5/2019</a:t>
+              <a:t>10/17/2019</a:t>
             </a:fld>
             <a:endParaRPr lang="en-US"/>
           </a:p>
@@ -2905,7 +2910,7 @@
           <a:p>
             <a:fld id="{FFE833FE-52F9-4C5E-990B-6B6F3E27B096}" type="datetimeFigureOut">
               <a:rPr lang="en-US" smtClean="0"/>
-              <a:t>10/5/2019</a:t>
+              <a:t>10/17/2019</a:t>
             </a:fld>
             <a:endParaRPr lang="en-US"/>
           </a:p>
@@ -3467,7 +3472,7 @@
             <a:pPr algn="ctr"/>
             <a:r>
               <a:rPr lang="en-US" dirty="0"/>
-              <a:t>AUC</a:t>
+              <a:t>AUC / Sensitivity Label</a:t>
             </a:r>
           </a:p>
         </p:txBody>
@@ -3494,8 +3499,7 @@
           </a:prstGeom>
           <a:solidFill>
             <a:schemeClr val="accent6">
-              <a:lumMod val="40000"/>
-              <a:lumOff val="60000"/>
+              <a:lumMod val="75000"/>
             </a:schemeClr>
           </a:solidFill>
         </p:spPr>
@@ -3549,8 +3553,7 @@
           </a:prstGeom>
           <a:solidFill>
             <a:schemeClr val="accent6">
-              <a:lumMod val="40000"/>
-              <a:lumOff val="60000"/>
+              <a:lumMod val="75000"/>
             </a:schemeClr>
           </a:solidFill>
         </p:spPr>
@@ -3608,8 +3611,7 @@
           </a:prstGeom>
           <a:solidFill>
             <a:schemeClr val="accent6">
-              <a:lumMod val="40000"/>
-              <a:lumOff val="60000"/>
+              <a:lumMod val="75000"/>
             </a:schemeClr>
           </a:solidFill>
         </p:spPr>
@@ -3640,7 +3642,7 @@
             </a:r>
             <a:r>
               <a:rPr lang="en-US" dirty="0"/>
-              <a:t> &lt;bool (4, g, 2)&gt;</a:t>
+              <a:t> &lt;bool (6, g, 2)&gt;</a:t>
             </a:r>
           </a:p>
         </p:txBody>
@@ -3666,10 +3668,7 @@
             <a:avLst/>
           </a:prstGeom>
           <a:solidFill>
-            <a:schemeClr val="accent2">
-              <a:lumMod val="60000"/>
-              <a:lumOff val="40000"/>
-            </a:schemeClr>
+            <a:srgbClr val="C00000"/>
           </a:solidFill>
         </p:spPr>
         <p:style>
@@ -3695,7 +3694,7 @@
             <a:pPr algn="ctr"/>
             <a:r>
               <a:rPr lang="en-US" dirty="0"/>
-              <a:t>[Drug] Target &lt;float (1,g)&gt;</a:t>
+              <a:t>[Drug] Targets &lt;float (1,g)&gt;</a:t>
             </a:r>
           </a:p>
         </p:txBody>
@@ -3714,7 +3713,7 @@
         </p:nvSpPr>
         <p:spPr>
           <a:xfrm>
-            <a:off x="4013860" y="6388924"/>
+            <a:off x="229591" y="323001"/>
             <a:ext cx="2341731" cy="369332"/>
           </a:xfrm>
           <a:prstGeom prst="rect">
@@ -3737,10 +3736,10 @@
       </p:sp>
       <p:sp>
         <p:nvSpPr>
-          <p:cNvPr id="12" name="Rectangle 11">
-            <a:extLst>
-              <a:ext uri="{FF2B5EF4-FFF2-40B4-BE49-F238E27FC236}">
-                <a16:creationId xmlns:a16="http://schemas.microsoft.com/office/drawing/2014/main" id="{AA8C5772-DC70-423E-83AB-052D1913B315}"/>
+          <p:cNvPr id="13" name="Rectangle 12">
+            <a:extLst>
+              <a:ext uri="{FF2B5EF4-FFF2-40B4-BE49-F238E27FC236}">
+                <a16:creationId xmlns:a16="http://schemas.microsoft.com/office/drawing/2014/main" id="{1B20F8D4-C86E-4730-9ABD-AB36D3C8B518}"/>
               </a:ext>
             </a:extLst>
           </p:cNvPr>
@@ -3749,17 +3748,14 @@
         </p:nvSpPr>
         <p:spPr>
           <a:xfrm>
-            <a:off x="229591" y="4764974"/>
+            <a:off x="229591" y="4949043"/>
             <a:ext cx="1670461" cy="670955"/>
           </a:xfrm>
           <a:prstGeom prst="rect">
             <a:avLst/>
           </a:prstGeom>
           <a:solidFill>
-            <a:schemeClr val="accent2">
-              <a:lumMod val="60000"/>
-              <a:lumOff val="40000"/>
-            </a:schemeClr>
+            <a:srgbClr val="C00000"/>
           </a:solidFill>
         </p:spPr>
         <p:style>
@@ -3785,150 +3781,11 @@
             <a:pPr algn="ctr"/>
             <a:r>
               <a:rPr lang="en-US" dirty="0"/>
-              <a:t>Drug Name</a:t>
-            </a:r>
-          </a:p>
-        </p:txBody>
-      </p:sp>
-      <p:sp>
-        <p:nvSpPr>
-          <p:cNvPr id="13" name="Rectangle 12">
-            <a:extLst>
-              <a:ext uri="{FF2B5EF4-FFF2-40B4-BE49-F238E27FC236}">
-                <a16:creationId xmlns:a16="http://schemas.microsoft.com/office/drawing/2014/main" id="{1B20F8D4-C86E-4730-9ABD-AB36D3C8B518}"/>
-              </a:ext>
-            </a:extLst>
-          </p:cNvPr>
-          <p:cNvSpPr/>
-          <p:nvPr/>
-        </p:nvSpPr>
-        <p:spPr>
-          <a:xfrm>
-            <a:off x="229591" y="5605153"/>
-            <a:ext cx="1670461" cy="670955"/>
-          </a:xfrm>
-          <a:prstGeom prst="rect">
-            <a:avLst/>
-          </a:prstGeom>
-          <a:solidFill>
-            <a:schemeClr val="accent2">
-              <a:lumMod val="60000"/>
-              <a:lumOff val="40000"/>
-            </a:schemeClr>
-          </a:solidFill>
-        </p:spPr>
-        <p:style>
-          <a:lnRef idx="2">
-            <a:schemeClr val="accent1">
-              <a:shade val="50000"/>
-            </a:schemeClr>
-          </a:lnRef>
-          <a:fillRef idx="1">
-            <a:schemeClr val="accent1"/>
-          </a:fillRef>
-          <a:effectRef idx="0">
-            <a:schemeClr val="accent1"/>
-          </a:effectRef>
-          <a:fontRef idx="minor">
-            <a:schemeClr val="lt1"/>
-          </a:fontRef>
-        </p:style>
-        <p:txBody>
-          <a:bodyPr rtlCol="0" anchor="ctr"/>
-          <a:lstStyle/>
-          <a:p>
-            <a:pPr algn="ctr"/>
-            <a:r>
-              <a:rPr lang="en-US" dirty="0"/>
               <a:t>Drug Family</a:t>
             </a:r>
           </a:p>
         </p:txBody>
       </p:sp>
-      <p:cxnSp>
-        <p:nvCxnSpPr>
-          <p:cNvPr id="15" name="Connector: Elbow 14">
-            <a:extLst>
-              <a:ext uri="{FF2B5EF4-FFF2-40B4-BE49-F238E27FC236}">
-                <a16:creationId xmlns:a16="http://schemas.microsoft.com/office/drawing/2014/main" id="{9E4B4592-D0C2-4482-9B0E-9C6BFA4B97E8}"/>
-              </a:ext>
-            </a:extLst>
-          </p:cNvPr>
-          <p:cNvCxnSpPr>
-            <a:stCxn id="7" idx="3"/>
-            <a:endCxn id="4" idx="1"/>
-          </p:cNvCxnSpPr>
-          <p:nvPr/>
-        </p:nvCxnSpPr>
-        <p:spPr>
-          <a:xfrm>
-            <a:off x="2737263" y="1573480"/>
-            <a:ext cx="1672441" cy="374073"/>
-          </a:xfrm>
-          <a:prstGeom prst="bentConnector3">
-            <a:avLst/>
-          </a:prstGeom>
-          <a:ln>
-            <a:tailEnd type="triangle"/>
-          </a:ln>
-        </p:spPr>
-        <p:style>
-          <a:lnRef idx="1">
-            <a:schemeClr val="accent1"/>
-          </a:lnRef>
-          <a:fillRef idx="0">
-            <a:schemeClr val="accent1"/>
-          </a:fillRef>
-          <a:effectRef idx="0">
-            <a:schemeClr val="accent1"/>
-          </a:effectRef>
-          <a:fontRef idx="minor">
-            <a:schemeClr val="tx1"/>
-          </a:fontRef>
-        </p:style>
-      </p:cxnSp>
-      <p:cxnSp>
-        <p:nvCxnSpPr>
-          <p:cNvPr id="17" name="Connector: Elbow 16">
-            <a:extLst>
-              <a:ext uri="{FF2B5EF4-FFF2-40B4-BE49-F238E27FC236}">
-                <a16:creationId xmlns:a16="http://schemas.microsoft.com/office/drawing/2014/main" id="{1330D13D-6F0E-43F3-85EB-43E7916C5A2E}"/>
-              </a:ext>
-            </a:extLst>
-          </p:cNvPr>
-          <p:cNvCxnSpPr>
-            <a:stCxn id="8" idx="3"/>
-            <a:endCxn id="4" idx="1"/>
-          </p:cNvCxnSpPr>
-          <p:nvPr/>
-        </p:nvCxnSpPr>
-        <p:spPr>
-          <a:xfrm flipV="1">
-            <a:off x="2737262" y="1947553"/>
-            <a:ext cx="1672442" cy="507670"/>
-          </a:xfrm>
-          <a:prstGeom prst="bentConnector3">
-            <a:avLst/>
-          </a:prstGeom>
-          <a:ln>
-            <a:tailEnd type="triangle"/>
-          </a:ln>
-        </p:spPr>
-        <p:style>
-          <a:lnRef idx="1">
-            <a:schemeClr val="accent1"/>
-          </a:lnRef>
-          <a:fillRef idx="0">
-            <a:schemeClr val="accent1"/>
-          </a:fillRef>
-          <a:effectRef idx="0">
-            <a:schemeClr val="accent1"/>
-          </a:effectRef>
-          <a:fontRef idx="minor">
-            <a:schemeClr val="tx1"/>
-          </a:fontRef>
-        </p:style>
-      </p:cxnSp>
       <p:cxnSp>
         <p:nvCxnSpPr>
           <p:cNvPr id="21" name="Connector: Elbow 20">
@@ -3981,61 +3838,20 @@
             </a:extLst>
           </p:cNvPr>
           <p:cNvCxnSpPr>
+            <a:cxnSpLocks/>
             <a:stCxn id="9" idx="3"/>
-            <a:endCxn id="4" idx="2"/>
           </p:cNvCxnSpPr>
           <p:nvPr/>
         </p:nvCxnSpPr>
         <p:spPr>
           <a:xfrm flipV="1">
-            <a:off x="2737263" y="2657104"/>
-            <a:ext cx="2753096" cy="679862"/>
+            <a:off x="2737263" y="2666012"/>
+            <a:ext cx="2283279" cy="670954"/>
           </a:xfrm>
-          <a:prstGeom prst="bentConnector2">
-            <a:avLst/>
-          </a:prstGeom>
-          <a:ln>
-            <a:tailEnd type="triangle"/>
-          </a:ln>
-        </p:spPr>
-        <p:style>
-          <a:lnRef idx="1">
-            <a:schemeClr val="accent1"/>
-          </a:lnRef>
-          <a:fillRef idx="0">
-            <a:schemeClr val="accent1"/>
-          </a:fillRef>
-          <a:effectRef idx="0">
-            <a:schemeClr val="accent1"/>
-          </a:effectRef>
-          <a:fontRef idx="minor">
-            <a:schemeClr val="tx1"/>
-          </a:fontRef>
-        </p:style>
-      </p:cxnSp>
-      <p:cxnSp>
-        <p:nvCxnSpPr>
-          <p:cNvPr id="26" name="Connector: Elbow 25">
-            <a:extLst>
-              <a:ext uri="{FF2B5EF4-FFF2-40B4-BE49-F238E27FC236}">
-                <a16:creationId xmlns:a16="http://schemas.microsoft.com/office/drawing/2014/main" id="{36425208-8EE1-4F34-9366-46038B9230BE}"/>
-              </a:ext>
-            </a:extLst>
-          </p:cNvPr>
-          <p:cNvCxnSpPr>
-            <a:cxnSpLocks/>
-            <a:stCxn id="12" idx="3"/>
-            <a:endCxn id="5" idx="2"/>
-          </p:cNvCxnSpPr>
-          <p:nvPr/>
-        </p:nvCxnSpPr>
-        <p:spPr>
-          <a:xfrm flipV="1">
-            <a:off x="1900052" y="2657104"/>
-            <a:ext cx="6271162" cy="2443348"/>
-          </a:xfrm>
-          <a:prstGeom prst="bentConnector2">
-            <a:avLst/>
+          <a:prstGeom prst="bentConnector3">
+            <a:avLst>
+              <a:gd name="adj1" fmla="val 100060"/>
+            </a:avLst>
           </a:prstGeom>
           <a:ln>
             <a:tailEnd type="triangle"/>
@@ -4075,7 +3891,7 @@
         <p:spPr>
           <a:xfrm flipV="1">
             <a:off x="1900052" y="2657104"/>
-            <a:ext cx="6271162" cy="3283527"/>
+            <a:ext cx="6271162" cy="2627417"/>
           </a:xfrm>
           <a:prstGeom prst="bentConnector2">
             <a:avLst/>
@@ -4183,6 +3999,174 @@
           </a:fontRef>
         </p:style>
       </p:cxnSp>
+      <p:cxnSp>
+        <p:nvCxnSpPr>
+          <p:cNvPr id="25" name="Straight Arrow Connector 24">
+            <a:extLst>
+              <a:ext uri="{FF2B5EF4-FFF2-40B4-BE49-F238E27FC236}">
+                <a16:creationId xmlns:a16="http://schemas.microsoft.com/office/drawing/2014/main" id="{A7D5DFFC-3C95-469E-8737-2656C9E0B6FE}"/>
+              </a:ext>
+            </a:extLst>
+          </p:cNvPr>
+          <p:cNvCxnSpPr>
+            <a:cxnSpLocks/>
+            <a:stCxn id="8" idx="3"/>
+          </p:cNvCxnSpPr>
+          <p:nvPr/>
+        </p:nvCxnSpPr>
+        <p:spPr>
+          <a:xfrm flipV="1">
+            <a:off x="2737262" y="2446315"/>
+            <a:ext cx="1672441" cy="8908"/>
+          </a:xfrm>
+          <a:prstGeom prst="straightConnector1">
+            <a:avLst/>
+          </a:prstGeom>
+          <a:ln>
+            <a:tailEnd type="triangle"/>
+          </a:ln>
+        </p:spPr>
+        <p:style>
+          <a:lnRef idx="1">
+            <a:schemeClr val="accent1"/>
+          </a:lnRef>
+          <a:fillRef idx="0">
+            <a:schemeClr val="accent1"/>
+          </a:fillRef>
+          <a:effectRef idx="0">
+            <a:schemeClr val="accent1"/>
+          </a:effectRef>
+          <a:fontRef idx="minor">
+            <a:schemeClr val="tx1"/>
+          </a:fontRef>
+        </p:style>
+      </p:cxnSp>
+      <p:cxnSp>
+        <p:nvCxnSpPr>
+          <p:cNvPr id="33" name="Straight Arrow Connector 32">
+            <a:extLst>
+              <a:ext uri="{FF2B5EF4-FFF2-40B4-BE49-F238E27FC236}">
+                <a16:creationId xmlns:a16="http://schemas.microsoft.com/office/drawing/2014/main" id="{01FA08F4-E39B-4D27-B867-793ECBA2820E}"/>
+              </a:ext>
+            </a:extLst>
+          </p:cNvPr>
+          <p:cNvCxnSpPr>
+            <a:stCxn id="7" idx="3"/>
+          </p:cNvCxnSpPr>
+          <p:nvPr/>
+        </p:nvCxnSpPr>
+        <p:spPr>
+          <a:xfrm flipV="1">
+            <a:off x="2737263" y="1553115"/>
+            <a:ext cx="1672440" cy="20365"/>
+          </a:xfrm>
+          <a:prstGeom prst="straightConnector1">
+            <a:avLst/>
+          </a:prstGeom>
+          <a:ln>
+            <a:tailEnd type="triangle"/>
+          </a:ln>
+        </p:spPr>
+        <p:style>
+          <a:lnRef idx="1">
+            <a:schemeClr val="accent1"/>
+          </a:lnRef>
+          <a:fillRef idx="0">
+            <a:schemeClr val="accent1"/>
+          </a:fillRef>
+          <a:effectRef idx="0">
+            <a:schemeClr val="accent1"/>
+          </a:effectRef>
+          <a:fontRef idx="minor">
+            <a:schemeClr val="tx1"/>
+          </a:fontRef>
+        </p:style>
+      </p:cxnSp>
+      <p:sp>
+        <p:nvSpPr>
+          <p:cNvPr id="34" name="Rectangle: Rounded Corners 33">
+            <a:extLst>
+              <a:ext uri="{FF2B5EF4-FFF2-40B4-BE49-F238E27FC236}">
+                <a16:creationId xmlns:a16="http://schemas.microsoft.com/office/drawing/2014/main" id="{A80DC9BA-7226-47C3-B360-F12A53BF981D}"/>
+              </a:ext>
+            </a:extLst>
+          </p:cNvPr>
+          <p:cNvSpPr/>
+          <p:nvPr/>
+        </p:nvSpPr>
+        <p:spPr>
+          <a:xfrm>
+            <a:off x="3878902" y="791191"/>
+            <a:ext cx="5800725" cy="2409209"/>
+          </a:xfrm>
+          <a:prstGeom prst="roundRect">
+            <a:avLst/>
+          </a:prstGeom>
+          <a:noFill/>
+          <a:ln w="76200">
+            <a:prstDash val="sysDash"/>
+          </a:ln>
+        </p:spPr>
+        <p:style>
+          <a:lnRef idx="2">
+            <a:schemeClr val="accent1">
+              <a:shade val="50000"/>
+            </a:schemeClr>
+          </a:lnRef>
+          <a:fillRef idx="1">
+            <a:schemeClr val="accent1"/>
+          </a:fillRef>
+          <a:effectRef idx="0">
+            <a:schemeClr val="accent1"/>
+          </a:effectRef>
+          <a:fontRef idx="minor">
+            <a:schemeClr val="lt1"/>
+          </a:fontRef>
+        </p:style>
+        <p:txBody>
+          <a:bodyPr rtlCol="0" anchor="ctr"/>
+          <a:lstStyle/>
+          <a:p>
+            <a:pPr algn="ctr"/>
+            <a:endParaRPr lang="en-US"/>
+          </a:p>
+        </p:txBody>
+      </p:sp>
+      <p:sp>
+        <p:nvSpPr>
+          <p:cNvPr id="35" name="TextBox 34">
+            <a:extLst>
+              <a:ext uri="{FF2B5EF4-FFF2-40B4-BE49-F238E27FC236}">
+                <a16:creationId xmlns:a16="http://schemas.microsoft.com/office/drawing/2014/main" id="{754A45E3-27FB-4A63-B2F1-1ABDF0101C84}"/>
+              </a:ext>
+            </a:extLst>
+          </p:cNvPr>
+          <p:cNvSpPr txBox="1"/>
+          <p:nvPr/>
+        </p:nvSpPr>
+        <p:spPr>
+          <a:xfrm>
+            <a:off x="5950798" y="382379"/>
+            <a:ext cx="2259978" cy="369332"/>
+          </a:xfrm>
+          <a:prstGeom prst="rect">
+            <a:avLst/>
+          </a:prstGeom>
+          <a:noFill/>
+        </p:spPr>
+        <p:txBody>
+          <a:bodyPr wrap="none" rtlCol="0">
+            <a:spAutoFit/>
+          </a:bodyPr>
+          <a:lstStyle/>
+          <a:p>
+            <a:r>
+              <a:rPr lang="en-US" b="1" dirty="0"/>
+              <a:t>Deep Neural Network</a:t>
+            </a:r>
+          </a:p>
+        </p:txBody>
+      </p:sp>
     </p:spTree>
     <p:extLst>
       <p:ext uri="{BB962C8B-B14F-4D97-AF65-F5344CB8AC3E}">

</xml_diff>